<commit_message>
Last version of slides and fixes to philo
</commit_message>
<xml_diff>
--- a/Dbg/Hosting PowerShell in a Debugger.pptx
+++ b/Dbg/Hosting PowerShell in a Debugger.pptx
@@ -6,10 +6,10 @@
     <p:sldMasterId id="2147483809" r:id="rId2"/>
   </p:sldMasterIdLst>
   <p:notesMasterIdLst>
-    <p:notesMasterId r:id="rId19"/>
+    <p:notesMasterId r:id="rId20"/>
   </p:notesMasterIdLst>
   <p:handoutMasterIdLst>
-    <p:handoutMasterId r:id="rId20"/>
+    <p:handoutMasterId r:id="rId21"/>
   </p:handoutMasterIdLst>
   <p:sldIdLst>
     <p:sldId id="309" r:id="rId3"/>
@@ -28,6 +28,7 @@
     <p:sldId id="324" r:id="rId16"/>
     <p:sldId id="313" r:id="rId17"/>
     <p:sldId id="314" r:id="rId18"/>
+    <p:sldId id="325" r:id="rId19"/>
   </p:sldIdLst>
   <p:sldSz cx="9144000" cy="6858000" type="screen4x3"/>
   <p:notesSz cx="7099300" cy="10234613"/>
@@ -1651,6 +1652,20 @@
             </a:r>
           </a:p>
           <a:p>
+            <a:pPr marL="628650" lvl="1" indent="-171450">
+              <a:buFont typeface="Arial" panose="020B0604020202020204" pitchFamily="34" charset="0"/>
+              <a:buChar char="•"/>
+            </a:pPr>
+            <a:r>
+              <a:rPr lang="en-US" baseline="0" dirty="0" err="1"/>
+              <a:t>Xcopy</a:t>
+            </a:r>
+            <a:r>
+              <a:rPr lang="en-US" baseline="0" dirty="0"/>
+              <a:t> deployable</a:t>
+            </a:r>
+          </a:p>
+          <a:p>
             <a:endParaRPr lang="en-US" baseline="0" dirty="0"/>
           </a:p>
           <a:p>
@@ -1692,7 +1707,7 @@
             </a:pPr>
             <a:r>
               <a:rPr lang="en-US" baseline="0" dirty="0"/>
-              <a:t>But if you are here, you have understood how Powerful a command line interface can be</a:t>
+              <a:t>But if you are here, you have understood how powerful a command line interface can be, and the value of scripting</a:t>
             </a:r>
           </a:p>
           <a:p>
@@ -1745,8 +1760,13 @@
             </a:pPr>
             <a:r>
               <a:rPr lang="en-US" baseline="0" dirty="0"/>
-              <a:t>We will look more into this</a:t>
-            </a:r>
+              <a:t>Native exports  from a </a:t>
+            </a:r>
+            <a:r>
+              <a:rPr lang="en-US" baseline="0" dirty="0" err="1"/>
+              <a:t>dll</a:t>
+            </a:r>
+            <a:endParaRPr lang="en-US" baseline="0" dirty="0"/>
           </a:p>
           <a:p>
             <a:pPr marL="0" lvl="0" indent="0">
@@ -1755,31 +1775,13 @@
             </a:pPr>
             <a:r>
               <a:rPr lang="en-US" baseline="0" dirty="0"/>
-              <a:t>			</a:t>
-            </a:r>
-          </a:p>
-          <a:p>
-            <a:pPr marL="171450" lvl="0" indent="-171450">
-              <a:buFont typeface="Arial" panose="020B0604020202020204" pitchFamily="34" charset="0"/>
-              <a:buChar char="•"/>
-            </a:pPr>
-            <a:r>
-              <a:rPr lang="en-US" baseline="0" dirty="0"/>
-              <a:t>Scripting language</a:t>
-            </a:r>
-          </a:p>
-          <a:p>
-            <a:pPr marL="628650" lvl="1" indent="-171450">
-              <a:buFont typeface="Arial" panose="020B0604020202020204" pitchFamily="34" charset="0"/>
-              <a:buChar char="•"/>
-            </a:pPr>
-            <a:r>
-              <a:rPr lang="en-US" baseline="0" dirty="0"/>
-              <a:t>If it already has a scripting language, aren’t we done?</a:t>
-            </a:r>
-          </a:p>
-          <a:p>
-            <a:endParaRPr lang="sv-SE" dirty="0"/>
+              <a:t>		</a:t>
+            </a:r>
+            <a:r>
+              <a:rPr lang="en-US" baseline="0"/>
+              <a:t>	</a:t>
+            </a:r>
+            <a:endParaRPr lang="en-US" baseline="0" dirty="0"/>
           </a:p>
         </p:txBody>
       </p:sp>
@@ -7428,6 +7430,34 @@
             </a:r>
           </a:p>
           <a:p>
+            <a:pPr lvl="1"/>
+            <a:r>
+              <a:rPr lang="de-DE" dirty="0"/>
+              <a:t>A </a:t>
+            </a:r>
+            <a:r>
+              <a:rPr lang="de-DE" dirty="0" err="1"/>
+              <a:t>few</a:t>
+            </a:r>
+            <a:r>
+              <a:rPr lang="de-DE" dirty="0"/>
+              <a:t> </a:t>
+            </a:r>
+            <a:r>
+              <a:rPr lang="de-DE" dirty="0" err="1"/>
+              <a:t>exported</a:t>
+            </a:r>
+            <a:r>
+              <a:rPr lang="de-DE" dirty="0"/>
+              <a:t> </a:t>
+            </a:r>
+            <a:r>
+              <a:rPr lang="de-DE" dirty="0" err="1"/>
+              <a:t>functions</a:t>
+            </a:r>
+            <a:endParaRPr lang="de-DE" dirty="0"/>
+          </a:p>
+          <a:p>
             <a:r>
               <a:rPr lang="de-DE" dirty="0" err="1"/>
               <a:t>PowerShell</a:t>
@@ -7438,29 +7468,6 @@
             </a:r>
           </a:p>
           <a:p>
-            <a:r>
-              <a:rPr lang="de-DE" dirty="0"/>
-              <a:t>Threads</a:t>
-            </a:r>
-          </a:p>
-          <a:p>
-            <a:pPr lvl="1"/>
-            <a:r>
-              <a:rPr lang="de-DE" dirty="0"/>
-              <a:t>Can </a:t>
-            </a:r>
-            <a:r>
-              <a:rPr lang="de-DE" dirty="0" err="1"/>
-              <a:t>be</a:t>
-            </a:r>
-            <a:r>
-              <a:rPr lang="de-DE" dirty="0"/>
-              <a:t> a </a:t>
-            </a:r>
-            <a:r>
-              <a:rPr lang="de-DE" dirty="0" err="1"/>
-              <a:t>problem</a:t>
-            </a:r>
             <a:endParaRPr lang="de-DE" dirty="0"/>
           </a:p>
           <a:p>
@@ -8009,6 +8016,104 @@
     <p:extLst>
       <p:ext uri="{BB962C8B-B14F-4D97-AF65-F5344CB8AC3E}">
         <p14:creationId xmlns:p14="http://schemas.microsoft.com/office/powerpoint/2010/main" val="4184402693"/>
+      </p:ext>
+    </p:extLst>
+  </p:cSld>
+  <p:clrMapOvr>
+    <a:masterClrMapping/>
+  </p:clrMapOvr>
+  <mc:AlternateContent xmlns:mc="http://schemas.openxmlformats.org/markup-compatibility/2006" xmlns:p14="http://schemas.microsoft.com/office/powerpoint/2010/main">
+    <mc:Choice Requires="p14">
+      <p:transition spd="med" p14:dur="700">
+        <p:fade/>
+      </p:transition>
+    </mc:Choice>
+    <mc:Fallback xmlns="">
+      <p:transition spd="med">
+        <p:fade/>
+      </p:transition>
+    </mc:Fallback>
+  </mc:AlternateContent>
+</p:sld>
+</file>
+
+<file path=ppt/slides/slide17.xml><?xml version="1.0" encoding="utf-8"?>
+<p:sld xmlns:a="http://schemas.openxmlformats.org/drawingml/2006/main" xmlns:r="http://schemas.openxmlformats.org/officeDocument/2006/relationships" xmlns:p="http://schemas.openxmlformats.org/presentationml/2006/main">
+  <p:cSld>
+    <p:spTree>
+      <p:nvGrpSpPr>
+        <p:cNvPr id="1" name=""/>
+        <p:cNvGrpSpPr/>
+        <p:nvPr/>
+      </p:nvGrpSpPr>
+      <p:grpSpPr>
+        <a:xfrm>
+          <a:off x="0" y="0"/>
+          <a:ext cx="0" cy="0"/>
+          <a:chOff x="0" y="0"/>
+          <a:chExt cx="0" cy="0"/>
+        </a:xfrm>
+      </p:grpSpPr>
+      <p:sp>
+        <p:nvSpPr>
+          <p:cNvPr id="2" name="Inhaltsplatzhalter 1"/>
+          <p:cNvSpPr>
+            <a:spLocks noGrp="1"/>
+          </p:cNvSpPr>
+          <p:nvPr>
+            <p:ph idx="1"/>
+          </p:nvPr>
+        </p:nvSpPr>
+        <p:spPr/>
+        <p:txBody>
+          <a:bodyPr/>
+          <a:lstStyle/>
+          <a:p>
+            <a:r>
+              <a:rPr lang="de-DE" dirty="0"/>
+              <a:t>@</a:t>
+            </a:r>
+            <a:r>
+              <a:rPr lang="de-DE" dirty="0" err="1"/>
+              <a:t>StaffanGson</a:t>
+            </a:r>
+            <a:endParaRPr lang="de-DE" dirty="0"/>
+          </a:p>
+          <a:p>
+            <a:r>
+              <a:rPr lang="de-DE" dirty="0"/>
+              <a:t>https://github.com/powercode</a:t>
+            </a:r>
+          </a:p>
+        </p:txBody>
+      </p:sp>
+      <p:sp>
+        <p:nvSpPr>
+          <p:cNvPr id="3" name="Titel 2"/>
+          <p:cNvSpPr>
+            <a:spLocks noGrp="1"/>
+          </p:cNvSpPr>
+          <p:nvPr>
+            <p:ph type="title"/>
+          </p:nvPr>
+        </p:nvSpPr>
+        <p:spPr/>
+        <p:txBody>
+          <a:bodyPr/>
+          <a:lstStyle/>
+          <a:p>
+            <a:r>
+              <a:rPr lang="de-DE" dirty="0" err="1"/>
+              <a:t>About_Speaker</a:t>
+            </a:r>
+            <a:endParaRPr lang="de-DE" dirty="0"/>
+          </a:p>
+        </p:txBody>
+      </p:sp>
+    </p:spTree>
+    <p:extLst>
+      <p:ext uri="{BB962C8B-B14F-4D97-AF65-F5344CB8AC3E}">
+        <p14:creationId xmlns:p14="http://schemas.microsoft.com/office/powerpoint/2010/main" val="3955015072"/>
       </p:ext>
     </p:extLst>
   </p:cSld>
@@ -9808,6 +9913,23 @@
             </a:endParaRPr>
           </a:p>
           <a:p>
+            <a:r>
+              <a:rPr lang="en-US" sz="1800" dirty="0">
+                <a:effectLst/>
+              </a:rPr>
+              <a:t>Unmanaged Exports</a:t>
+            </a:r>
+          </a:p>
+          <a:p>
+            <a:pPr lvl="1"/>
+            <a:r>
+              <a:rPr lang="en-US" dirty="0"/>
+              <a:t>Robert </a:t>
+            </a:r>
+            <a:r>
+              <a:rPr lang="en-US" dirty="0" err="1"/>
+              <a:t>Giesecke</a:t>
+            </a:r>
             <a:endParaRPr lang="sv-SE" dirty="0"/>
           </a:p>
         </p:txBody>
@@ -10122,6 +10244,86 @@
                                         <a:srgbClr val="FF0000"/>
                                       </p:to>
                                     </p:animClr>
+                                  </p:childTnLst>
+                                </p:cTn>
+                              </p:par>
+                            </p:childTnLst>
+                          </p:cTn>
+                        </p:par>
+                      </p:childTnLst>
+                    </p:cTn>
+                  </p:par>
+                  <p:par>
+                    <p:cTn id="23" fill="hold">
+                      <p:stCondLst>
+                        <p:cond delay="indefinite"/>
+                      </p:stCondLst>
+                      <p:childTnLst>
+                        <p:par>
+                          <p:cTn id="24" fill="hold">
+                            <p:stCondLst>
+                              <p:cond delay="0"/>
+                            </p:stCondLst>
+                            <p:childTnLst>
+                              <p:par>
+                                <p:cTn id="25" presetID="1" presetClass="entr" presetSubtype="0" fill="hold" nodeType="clickEffect">
+                                  <p:stCondLst>
+                                    <p:cond delay="0"/>
+                                  </p:stCondLst>
+                                  <p:childTnLst>
+                                    <p:set>
+                                      <p:cBhvr>
+                                        <p:cTn id="26" dur="1" fill="hold">
+                                          <p:stCondLst>
+                                            <p:cond delay="0"/>
+                                          </p:stCondLst>
+                                        </p:cTn>
+                                        <p:tgtEl>
+                                          <p:spTgt spid="2">
+                                            <p:txEl>
+                                              <p:pRg st="10" end="10"/>
+                                            </p:txEl>
+                                          </p:spTgt>
+                                        </p:tgtEl>
+                                        <p:attrNameLst>
+                                          <p:attrName>style.visibility</p:attrName>
+                                        </p:attrNameLst>
+                                      </p:cBhvr>
+                                      <p:to>
+                                        <p:strVal val="visible"/>
+                                      </p:to>
+                                    </p:set>
+                                  </p:childTnLst>
+                                </p:cTn>
+                              </p:par>
+                              <p:par>
+                                <p:cTn id="27" presetID="1" presetClass="entr" presetSubtype="0" fill="hold" nodeType="withEffect">
+                                  <p:stCondLst>
+                                    <p:cond delay="0"/>
+                                  </p:stCondLst>
+                                  <p:childTnLst>
+                                    <p:set>
+                                      <p:cBhvr>
+                                        <p:cTn id="28" dur="1" fill="hold">
+                                          <p:stCondLst>
+                                            <p:cond delay="0"/>
+                                          </p:stCondLst>
+                                        </p:cTn>
+                                        <p:tgtEl>
+                                          <p:spTgt spid="2">
+                                            <p:txEl>
+                                              <p:pRg st="11" end="11"/>
+                                            </p:txEl>
+                                          </p:spTgt>
+                                        </p:tgtEl>
+                                        <p:attrNameLst>
+                                          <p:attrName>style.visibility</p:attrName>
+                                        </p:attrNameLst>
+                                      </p:cBhvr>
+                                      <p:to>
+                                        <p:strVal val="visible"/>
+                                      </p:to>
+                                    </p:set>
                                   </p:childTnLst>
                                 </p:cTn>
                               </p:par>

</xml_diff>